<commit_message>
reorg project and add new theme
</commit_message>
<xml_diff>
--- a/Mock Up/Mock-Up.pptx
+++ b/Mock Up/Mock-Up.pptx
@@ -268,7 +268,7 @@
           <a:p>
             <a:fld id="{B8294A62-C672-43B3-BD2F-F8F0AA1015E3}" type="datetimeFigureOut">
               <a:rPr lang="de-CH" smtClean="0"/>
-              <a:t>26.02.2022</a:t>
+              <a:t>27.02.2022</a:t>
             </a:fld>
             <a:endParaRPr lang="de-CH"/>
           </a:p>
@@ -468,7 +468,7 @@
           <a:p>
             <a:fld id="{B8294A62-C672-43B3-BD2F-F8F0AA1015E3}" type="datetimeFigureOut">
               <a:rPr lang="de-CH" smtClean="0"/>
-              <a:t>26.02.2022</a:t>
+              <a:t>27.02.2022</a:t>
             </a:fld>
             <a:endParaRPr lang="de-CH"/>
           </a:p>
@@ -678,7 +678,7 @@
           <a:p>
             <a:fld id="{B8294A62-C672-43B3-BD2F-F8F0AA1015E3}" type="datetimeFigureOut">
               <a:rPr lang="de-CH" smtClean="0"/>
-              <a:t>26.02.2022</a:t>
+              <a:t>27.02.2022</a:t>
             </a:fld>
             <a:endParaRPr lang="de-CH"/>
           </a:p>
@@ -878,7 +878,7 @@
           <a:p>
             <a:fld id="{B8294A62-C672-43B3-BD2F-F8F0AA1015E3}" type="datetimeFigureOut">
               <a:rPr lang="de-CH" smtClean="0"/>
-              <a:t>26.02.2022</a:t>
+              <a:t>27.02.2022</a:t>
             </a:fld>
             <a:endParaRPr lang="de-CH"/>
           </a:p>
@@ -1154,7 +1154,7 @@
           <a:p>
             <a:fld id="{B8294A62-C672-43B3-BD2F-F8F0AA1015E3}" type="datetimeFigureOut">
               <a:rPr lang="de-CH" smtClean="0"/>
-              <a:t>26.02.2022</a:t>
+              <a:t>27.02.2022</a:t>
             </a:fld>
             <a:endParaRPr lang="de-CH"/>
           </a:p>
@@ -1422,7 +1422,7 @@
           <a:p>
             <a:fld id="{B8294A62-C672-43B3-BD2F-F8F0AA1015E3}" type="datetimeFigureOut">
               <a:rPr lang="de-CH" smtClean="0"/>
-              <a:t>26.02.2022</a:t>
+              <a:t>27.02.2022</a:t>
             </a:fld>
             <a:endParaRPr lang="de-CH"/>
           </a:p>
@@ -1837,7 +1837,7 @@
           <a:p>
             <a:fld id="{B8294A62-C672-43B3-BD2F-F8F0AA1015E3}" type="datetimeFigureOut">
               <a:rPr lang="de-CH" smtClean="0"/>
-              <a:t>26.02.2022</a:t>
+              <a:t>27.02.2022</a:t>
             </a:fld>
             <a:endParaRPr lang="de-CH"/>
           </a:p>
@@ -1979,7 +1979,7 @@
           <a:p>
             <a:fld id="{B8294A62-C672-43B3-BD2F-F8F0AA1015E3}" type="datetimeFigureOut">
               <a:rPr lang="de-CH" smtClean="0"/>
-              <a:t>26.02.2022</a:t>
+              <a:t>27.02.2022</a:t>
             </a:fld>
             <a:endParaRPr lang="de-CH"/>
           </a:p>
@@ -2092,7 +2092,7 @@
           <a:p>
             <a:fld id="{B8294A62-C672-43B3-BD2F-F8F0AA1015E3}" type="datetimeFigureOut">
               <a:rPr lang="de-CH" smtClean="0"/>
-              <a:t>26.02.2022</a:t>
+              <a:t>27.02.2022</a:t>
             </a:fld>
             <a:endParaRPr lang="de-CH"/>
           </a:p>
@@ -2405,7 +2405,7 @@
           <a:p>
             <a:fld id="{B8294A62-C672-43B3-BD2F-F8F0AA1015E3}" type="datetimeFigureOut">
               <a:rPr lang="de-CH" smtClean="0"/>
-              <a:t>26.02.2022</a:t>
+              <a:t>27.02.2022</a:t>
             </a:fld>
             <a:endParaRPr lang="de-CH"/>
           </a:p>
@@ -2694,7 +2694,7 @@
           <a:p>
             <a:fld id="{B8294A62-C672-43B3-BD2F-F8F0AA1015E3}" type="datetimeFigureOut">
               <a:rPr lang="de-CH" smtClean="0"/>
-              <a:t>26.02.2022</a:t>
+              <a:t>27.02.2022</a:t>
             </a:fld>
             <a:endParaRPr lang="de-CH"/>
           </a:p>
@@ -2937,7 +2937,7 @@
           <a:p>
             <a:fld id="{B8294A62-C672-43B3-BD2F-F8F0AA1015E3}" type="datetimeFigureOut">
               <a:rPr lang="de-CH" smtClean="0"/>
-              <a:t>26.02.2022</a:t>
+              <a:t>27.02.2022</a:t>
             </a:fld>
             <a:endParaRPr lang="de-CH"/>
           </a:p>

</xml_diff>

<commit_message>
adjust some details on mockup
</commit_message>
<xml_diff>
--- a/Mock Up/Mock-Up.pptx
+++ b/Mock Up/Mock-Up.pptx
@@ -268,7 +268,7 @@
           <a:p>
             <a:fld id="{B8294A62-C672-43B3-BD2F-F8F0AA1015E3}" type="datetimeFigureOut">
               <a:rPr lang="de-CH" smtClean="0"/>
-              <a:t>27.02.2022</a:t>
+              <a:t>28.02.2022</a:t>
             </a:fld>
             <a:endParaRPr lang="de-CH"/>
           </a:p>
@@ -468,7 +468,7 @@
           <a:p>
             <a:fld id="{B8294A62-C672-43B3-BD2F-F8F0AA1015E3}" type="datetimeFigureOut">
               <a:rPr lang="de-CH" smtClean="0"/>
-              <a:t>27.02.2022</a:t>
+              <a:t>28.02.2022</a:t>
             </a:fld>
             <a:endParaRPr lang="de-CH"/>
           </a:p>
@@ -678,7 +678,7 @@
           <a:p>
             <a:fld id="{B8294A62-C672-43B3-BD2F-F8F0AA1015E3}" type="datetimeFigureOut">
               <a:rPr lang="de-CH" smtClean="0"/>
-              <a:t>27.02.2022</a:t>
+              <a:t>28.02.2022</a:t>
             </a:fld>
             <a:endParaRPr lang="de-CH"/>
           </a:p>
@@ -878,7 +878,7 @@
           <a:p>
             <a:fld id="{B8294A62-C672-43B3-BD2F-F8F0AA1015E3}" type="datetimeFigureOut">
               <a:rPr lang="de-CH" smtClean="0"/>
-              <a:t>27.02.2022</a:t>
+              <a:t>28.02.2022</a:t>
             </a:fld>
             <a:endParaRPr lang="de-CH"/>
           </a:p>
@@ -1154,7 +1154,7 @@
           <a:p>
             <a:fld id="{B8294A62-C672-43B3-BD2F-F8F0AA1015E3}" type="datetimeFigureOut">
               <a:rPr lang="de-CH" smtClean="0"/>
-              <a:t>27.02.2022</a:t>
+              <a:t>28.02.2022</a:t>
             </a:fld>
             <a:endParaRPr lang="de-CH"/>
           </a:p>
@@ -1422,7 +1422,7 @@
           <a:p>
             <a:fld id="{B8294A62-C672-43B3-BD2F-F8F0AA1015E3}" type="datetimeFigureOut">
               <a:rPr lang="de-CH" smtClean="0"/>
-              <a:t>27.02.2022</a:t>
+              <a:t>28.02.2022</a:t>
             </a:fld>
             <a:endParaRPr lang="de-CH"/>
           </a:p>
@@ -1837,7 +1837,7 @@
           <a:p>
             <a:fld id="{B8294A62-C672-43B3-BD2F-F8F0AA1015E3}" type="datetimeFigureOut">
               <a:rPr lang="de-CH" smtClean="0"/>
-              <a:t>27.02.2022</a:t>
+              <a:t>28.02.2022</a:t>
             </a:fld>
             <a:endParaRPr lang="de-CH"/>
           </a:p>
@@ -1979,7 +1979,7 @@
           <a:p>
             <a:fld id="{B8294A62-C672-43B3-BD2F-F8F0AA1015E3}" type="datetimeFigureOut">
               <a:rPr lang="de-CH" smtClean="0"/>
-              <a:t>27.02.2022</a:t>
+              <a:t>28.02.2022</a:t>
             </a:fld>
             <a:endParaRPr lang="de-CH"/>
           </a:p>
@@ -2092,7 +2092,7 @@
           <a:p>
             <a:fld id="{B8294A62-C672-43B3-BD2F-F8F0AA1015E3}" type="datetimeFigureOut">
               <a:rPr lang="de-CH" smtClean="0"/>
-              <a:t>27.02.2022</a:t>
+              <a:t>28.02.2022</a:t>
             </a:fld>
             <a:endParaRPr lang="de-CH"/>
           </a:p>
@@ -2405,7 +2405,7 @@
           <a:p>
             <a:fld id="{B8294A62-C672-43B3-BD2F-F8F0AA1015E3}" type="datetimeFigureOut">
               <a:rPr lang="de-CH" smtClean="0"/>
-              <a:t>27.02.2022</a:t>
+              <a:t>28.02.2022</a:t>
             </a:fld>
             <a:endParaRPr lang="de-CH"/>
           </a:p>
@@ -2694,7 +2694,7 @@
           <a:p>
             <a:fld id="{B8294A62-C672-43B3-BD2F-F8F0AA1015E3}" type="datetimeFigureOut">
               <a:rPr lang="de-CH" smtClean="0"/>
-              <a:t>27.02.2022</a:t>
+              <a:t>28.02.2022</a:t>
             </a:fld>
             <a:endParaRPr lang="de-CH"/>
           </a:p>
@@ -2937,7 +2937,7 @@
           <a:p>
             <a:fld id="{B8294A62-C672-43B3-BD2F-F8F0AA1015E3}" type="datetimeFigureOut">
               <a:rPr lang="de-CH" smtClean="0"/>
-              <a:t>27.02.2022</a:t>
+              <a:t>28.02.2022</a:t>
             </a:fld>
             <a:endParaRPr lang="de-CH"/>
           </a:p>
@@ -16230,7 +16230,7 @@
                 <a:latin typeface="Arial" panose="020B0604020202020204" pitchFamily="34" charset="0"/>
                 <a:cs typeface="Arial" panose="020B0604020202020204" pitchFamily="34" charset="0"/>
               </a:rPr>
-              <a:t>Bruttolohn Pensum 100%:</a:t>
+              <a:t>Berechneter Stundensatz:</a:t>
             </a:r>
             <a:endParaRPr lang="de-CH" sz="1200" dirty="0">
               <a:latin typeface="Arial" panose="020B0604020202020204" pitchFamily="34" charset="0"/>

</xml_diff>